<commit_message>
Added fourth practice + minor edits
</commit_message>
<xml_diff>
--- a/slides/lecture4.pptx
+++ b/slides/lecture4.pptx
@@ -8392,8 +8392,8 @@
         </p:nvSpPr>
         <p:spPr>
           <a:xfrm>
-            <a:off x="3751342" y="2689393"/>
-            <a:ext cx="5502116" cy="774572"/>
+            <a:off x="3751341" y="2689393"/>
+            <a:ext cx="5502117" cy="774572"/>
           </a:xfrm>
           <a:prstGeom prst="rect">
             <a:avLst/>
@@ -9059,7 +9059,7 @@
         </p:nvSpPr>
         <p:spPr>
           <a:xfrm>
-            <a:off x="3763326" y="4532866"/>
+            <a:off x="3763326" y="4532865"/>
             <a:ext cx="5478148" cy="1420304"/>
           </a:xfrm>
           <a:prstGeom prst="rect">
@@ -10311,7 +10311,7 @@
               </a:defRPr>
             </a:pPr>
             <a:r>
-              <a:t>210</a:t>
+              <a:t>[1, 2, 3, 4, 5]</a:t>
             </a:r>
           </a:p>
         </p:txBody>
@@ -11013,7 +11013,7 @@
         <p:spPr>
           <a:xfrm>
             <a:off x="909307" y="1550378"/>
-            <a:ext cx="2929948" cy="972253"/>
+            <a:ext cx="2929948" cy="972254"/>
           </a:xfrm>
           <a:prstGeom prst="rect">
             <a:avLst/>
@@ -13259,8 +13259,8 @@
         </p:nvSpPr>
         <p:spPr>
           <a:xfrm>
-            <a:off x="5052921" y="1973399"/>
-            <a:ext cx="3939028" cy="1336724"/>
+            <a:off x="5052921" y="1973398"/>
+            <a:ext cx="3939028" cy="1336725"/>
           </a:xfrm>
           <a:prstGeom prst="rect">
             <a:avLst/>

</xml_diff>